<commit_message>
Updated presentation and added paper.
</commit_message>
<xml_diff>
--- a/4_CorrelationsInCauseofDeath_Part6.pptx
+++ b/4_CorrelationsInCauseofDeath_Part6.pptx
@@ -117,6 +117,11 @@
       </a:defRPr>
     </a:lvl9pPr>
   </p:defaultTextStyle>
+  <p:extLst>
+    <p:ext uri="{EFAFB233-063F-42B5-8137-9DF3F51BA10A}">
+      <p15:sldGuideLst xmlns:p15="http://schemas.microsoft.com/office/powerpoint/2012/main"/>
+    </p:ext>
+  </p:extLst>
 </p:presentation>
 </file>
 
@@ -1100,6 +1105,54 @@
           </a:prstGeom>
         </p:spPr>
       </p:pic>
+      <p:sp>
+        <p:nvSpPr>
+          <p:cNvPr id="4" name="Arrow: Down 3"/>
+          <p:cNvSpPr/>
+          <p:nvPr/>
+        </p:nvSpPr>
+        <p:spPr>
+          <a:xfrm rot="1003648">
+            <a:off x="6798670" y="3461525"/>
+            <a:ext cx="303148" cy="524698"/>
+          </a:xfrm>
+          <a:prstGeom prst="downArrow">
+            <a:avLst/>
+          </a:prstGeom>
+          <a:solidFill>
+            <a:srgbClr val="FF0000"/>
+          </a:solidFill>
+          <a:ln>
+            <a:solidFill>
+              <a:srgbClr val="FF0000"/>
+            </a:solidFill>
+          </a:ln>
+        </p:spPr>
+        <p:style>
+          <a:lnRef idx="2">
+            <a:schemeClr val="accent1">
+              <a:shade val="50000"/>
+            </a:schemeClr>
+          </a:lnRef>
+          <a:fillRef idx="1">
+            <a:schemeClr val="accent1"/>
+          </a:fillRef>
+          <a:effectRef idx="0">
+            <a:schemeClr val="accent1"/>
+          </a:effectRef>
+          <a:fontRef idx="minor">
+            <a:schemeClr val="lt1"/>
+          </a:fontRef>
+        </p:style>
+        <p:txBody>
+          <a:bodyPr rtlCol="0" anchor="ctr"/>
+          <a:lstStyle/>
+          <a:p>
+            <a:pPr algn="ctr"/>
+            <a:endParaRPr lang="en-US"/>
+          </a:p>
+        </p:txBody>
+      </p:sp>
     </p:spTree>
     <p:extLst>
       <p:ext uri="{BB962C8B-B14F-4D97-AF65-F5344CB8AC3E}">
@@ -1925,6 +1978,102 @@
           </a:prstGeom>
         </p:spPr>
       </p:pic>
+      <p:sp>
+        <p:nvSpPr>
+          <p:cNvPr id="4" name="Arrow: Down 3"/>
+          <p:cNvSpPr/>
+          <p:nvPr/>
+        </p:nvSpPr>
+        <p:spPr>
+          <a:xfrm rot="18798008">
+            <a:off x="10944881" y="2429092"/>
+            <a:ext cx="303148" cy="524698"/>
+          </a:xfrm>
+          <a:prstGeom prst="downArrow">
+            <a:avLst/>
+          </a:prstGeom>
+          <a:solidFill>
+            <a:srgbClr val="FF0000"/>
+          </a:solidFill>
+          <a:ln>
+            <a:solidFill>
+              <a:srgbClr val="FF0000"/>
+            </a:solidFill>
+          </a:ln>
+        </p:spPr>
+        <p:style>
+          <a:lnRef idx="2">
+            <a:schemeClr val="accent1">
+              <a:shade val="50000"/>
+            </a:schemeClr>
+          </a:lnRef>
+          <a:fillRef idx="1">
+            <a:schemeClr val="accent1"/>
+          </a:fillRef>
+          <a:effectRef idx="0">
+            <a:schemeClr val="accent1"/>
+          </a:effectRef>
+          <a:fontRef idx="minor">
+            <a:schemeClr val="lt1"/>
+          </a:fontRef>
+        </p:style>
+        <p:txBody>
+          <a:bodyPr rtlCol="0" anchor="ctr"/>
+          <a:lstStyle/>
+          <a:p>
+            <a:pPr algn="ctr"/>
+            <a:endParaRPr lang="en-US"/>
+          </a:p>
+        </p:txBody>
+      </p:sp>
+      <p:sp>
+        <p:nvSpPr>
+          <p:cNvPr id="5" name="Arrow: Down 4"/>
+          <p:cNvSpPr/>
+          <p:nvPr/>
+        </p:nvSpPr>
+        <p:spPr>
+          <a:xfrm rot="18798008">
+            <a:off x="7600225" y="3456886"/>
+            <a:ext cx="303148" cy="524698"/>
+          </a:xfrm>
+          <a:prstGeom prst="downArrow">
+            <a:avLst/>
+          </a:prstGeom>
+          <a:solidFill>
+            <a:srgbClr val="FF0000"/>
+          </a:solidFill>
+          <a:ln>
+            <a:solidFill>
+              <a:srgbClr val="FF0000"/>
+            </a:solidFill>
+          </a:ln>
+        </p:spPr>
+        <p:style>
+          <a:lnRef idx="2">
+            <a:schemeClr val="accent1">
+              <a:shade val="50000"/>
+            </a:schemeClr>
+          </a:lnRef>
+          <a:fillRef idx="1">
+            <a:schemeClr val="accent1"/>
+          </a:fillRef>
+          <a:effectRef idx="0">
+            <a:schemeClr val="accent1"/>
+          </a:effectRef>
+          <a:fontRef idx="minor">
+            <a:schemeClr val="lt1"/>
+          </a:fontRef>
+        </p:style>
+        <p:txBody>
+          <a:bodyPr rtlCol="0" anchor="ctr"/>
+          <a:lstStyle/>
+          <a:p>
+            <a:pPr algn="ctr"/>
+            <a:endParaRPr lang="en-US"/>
+          </a:p>
+        </p:txBody>
+      </p:sp>
     </p:spTree>
     <p:extLst>
       <p:ext uri="{BB962C8B-B14F-4D97-AF65-F5344CB8AC3E}">
@@ -2014,6 +2163,102 @@
           </a:prstGeom>
         </p:spPr>
       </p:pic>
+      <p:sp>
+        <p:nvSpPr>
+          <p:cNvPr id="5" name="Arrow: Down 4"/>
+          <p:cNvSpPr/>
+          <p:nvPr/>
+        </p:nvSpPr>
+        <p:spPr>
+          <a:xfrm rot="18798008">
+            <a:off x="2757161" y="3867004"/>
+            <a:ext cx="303148" cy="524698"/>
+          </a:xfrm>
+          <a:prstGeom prst="downArrow">
+            <a:avLst/>
+          </a:prstGeom>
+          <a:solidFill>
+            <a:srgbClr val="FF0000"/>
+          </a:solidFill>
+          <a:ln>
+            <a:solidFill>
+              <a:srgbClr val="FF0000"/>
+            </a:solidFill>
+          </a:ln>
+        </p:spPr>
+        <p:style>
+          <a:lnRef idx="2">
+            <a:schemeClr val="accent1">
+              <a:shade val="50000"/>
+            </a:schemeClr>
+          </a:lnRef>
+          <a:fillRef idx="1">
+            <a:schemeClr val="accent1"/>
+          </a:fillRef>
+          <a:effectRef idx="0">
+            <a:schemeClr val="accent1"/>
+          </a:effectRef>
+          <a:fontRef idx="minor">
+            <a:schemeClr val="lt1"/>
+          </a:fontRef>
+        </p:style>
+        <p:txBody>
+          <a:bodyPr rtlCol="0" anchor="ctr"/>
+          <a:lstStyle/>
+          <a:p>
+            <a:pPr algn="ctr"/>
+            <a:endParaRPr lang="en-US"/>
+          </a:p>
+        </p:txBody>
+      </p:sp>
+      <p:sp>
+        <p:nvSpPr>
+          <p:cNvPr id="6" name="Arrow: Down 5"/>
+          <p:cNvSpPr/>
+          <p:nvPr/>
+        </p:nvSpPr>
+        <p:spPr>
+          <a:xfrm rot="18798008">
+            <a:off x="10692431" y="731753"/>
+            <a:ext cx="303148" cy="524698"/>
+          </a:xfrm>
+          <a:prstGeom prst="downArrow">
+            <a:avLst/>
+          </a:prstGeom>
+          <a:solidFill>
+            <a:srgbClr val="FF0000"/>
+          </a:solidFill>
+          <a:ln>
+            <a:solidFill>
+              <a:srgbClr val="FF0000"/>
+            </a:solidFill>
+          </a:ln>
+        </p:spPr>
+        <p:style>
+          <a:lnRef idx="2">
+            <a:schemeClr val="accent1">
+              <a:shade val="50000"/>
+            </a:schemeClr>
+          </a:lnRef>
+          <a:fillRef idx="1">
+            <a:schemeClr val="accent1"/>
+          </a:fillRef>
+          <a:effectRef idx="0">
+            <a:schemeClr val="accent1"/>
+          </a:effectRef>
+          <a:fontRef idx="minor">
+            <a:schemeClr val="lt1"/>
+          </a:fontRef>
+        </p:style>
+        <p:txBody>
+          <a:bodyPr rtlCol="0" anchor="ctr"/>
+          <a:lstStyle/>
+          <a:p>
+            <a:pPr algn="ctr"/>
+            <a:endParaRPr lang="en-US"/>
+          </a:p>
+        </p:txBody>
+      </p:sp>
     </p:spTree>
     <p:extLst>
       <p:ext uri="{BB962C8B-B14F-4D97-AF65-F5344CB8AC3E}">

</xml_diff>